<commit_message>
Add Reverse Linked List
</commit_message>
<xml_diff>
--- a/doc/Pattern/15_Ch01_DesignPattern.pptx
+++ b/doc/Pattern/15_Ch01_DesignPattern.pptx
@@ -221,7 +221,7 @@
             <a:fld id="{42650A08-1FBC-433B-9B88-98D5F8B842CD}" type="datetimeFigureOut">
               <a:rPr lang="en-US" smtClean="0"/>
               <a:pPr/>
-              <a:t>3/20/2017</a:t>
+              <a:t>3/21/2017</a:t>
             </a:fld>
             <a:endParaRPr lang="en-US"/>
           </a:p>
@@ -675,7 +675,7 @@
             <a:fld id="{20DBA455-7F56-4B23-8C82-E4D287D136B3}" type="datetime1">
               <a:rPr lang="en-US" smtClean="0"/>
               <a:pPr/>
-              <a:t>3/20/2017</a:t>
+              <a:t>3/21/2017</a:t>
             </a:fld>
             <a:endParaRPr lang="en-US"/>
           </a:p>
@@ -883,7 +883,7 @@
             <a:fld id="{6FF125D9-66EE-4E3E-BC82-15E0BEAA237B}" type="datetime1">
               <a:rPr lang="en-US" smtClean="0"/>
               <a:pPr/>
-              <a:t>3/20/2017</a:t>
+              <a:t>3/21/2017</a:t>
             </a:fld>
             <a:endParaRPr lang="en-US"/>
           </a:p>
@@ -1065,7 +1065,7 @@
             <a:fld id="{14E4EB4F-BE98-498F-B5C2-6D6FF577F12E}" type="datetime1">
               <a:rPr lang="en-US" smtClean="0"/>
               <a:pPr/>
-              <a:t>3/20/2017</a:t>
+              <a:t>3/21/2017</a:t>
             </a:fld>
             <a:endParaRPr lang="en-US"/>
           </a:p>
@@ -1928,7 +1928,7 @@
                 </a:solidFill>
               </a:rPr>
               <a:pPr/>
-              <a:t>3/20/2017</a:t>
+              <a:t>3/21/2017</a:t>
             </a:fld>
             <a:endParaRPr lang="en-US">
               <a:solidFill>
@@ -2142,7 +2142,7 @@
                 </a:solidFill>
               </a:rPr>
               <a:pPr/>
-              <a:t>3/20/2017</a:t>
+              <a:t>3/21/2017</a:t>
             </a:fld>
             <a:endParaRPr lang="en-US">
               <a:solidFill>
@@ -2438,7 +2438,7 @@
                 </a:solidFill>
               </a:rPr>
               <a:pPr/>
-              <a:t>3/20/2017</a:t>
+              <a:t>3/21/2017</a:t>
             </a:fld>
             <a:endParaRPr lang="en-US">
               <a:solidFill>
@@ -2763,7 +2763,7 @@
                 </a:solidFill>
               </a:rPr>
               <a:pPr/>
-              <a:t>3/20/2017</a:t>
+              <a:t>3/21/2017</a:t>
             </a:fld>
             <a:endParaRPr lang="en-US">
               <a:solidFill>
@@ -3170,7 +3170,7 @@
                 </a:solidFill>
               </a:rPr>
               <a:pPr/>
-              <a:t>3/20/2017</a:t>
+              <a:t>3/21/2017</a:t>
             </a:fld>
             <a:endParaRPr lang="en-US">
               <a:solidFill>
@@ -3321,7 +3321,7 @@
                 </a:solidFill>
               </a:rPr>
               <a:pPr/>
-              <a:t>3/20/2017</a:t>
+              <a:t>3/21/2017</a:t>
             </a:fld>
             <a:endParaRPr lang="en-US">
               <a:solidFill>
@@ -3444,7 +3444,7 @@
                 </a:solidFill>
               </a:rPr>
               <a:pPr/>
-              <a:t>3/20/2017</a:t>
+              <a:t>3/21/2017</a:t>
             </a:fld>
             <a:endParaRPr lang="en-US">
               <a:solidFill>
@@ -3727,7 +3727,7 @@
                 </a:solidFill>
               </a:rPr>
               <a:pPr/>
-              <a:t>3/20/2017</a:t>
+              <a:t>3/21/2017</a:t>
             </a:fld>
             <a:endParaRPr lang="en-US">
               <a:solidFill>
@@ -3919,7 +3919,7 @@
             <a:fld id="{7E26ABC0-02D2-4791-BA93-BE3538C06062}" type="datetime1">
               <a:rPr lang="en-US" smtClean="0"/>
               <a:pPr/>
-              <a:t>3/20/2017</a:t>
+              <a:t>3/21/2017</a:t>
             </a:fld>
             <a:endParaRPr lang="en-US"/>
           </a:p>
@@ -4203,7 +4203,7 @@
                 </a:solidFill>
               </a:rPr>
               <a:pPr/>
-              <a:t>3/20/2017</a:t>
+              <a:t>3/21/2017</a:t>
             </a:fld>
             <a:endParaRPr lang="en-US">
               <a:solidFill>
@@ -4482,7 +4482,7 @@
                 </a:solidFill>
               </a:rPr>
               <a:pPr/>
-              <a:t>3/20/2017</a:t>
+              <a:t>3/21/2017</a:t>
             </a:fld>
             <a:endParaRPr lang="en-US">
               <a:solidFill>
@@ -4825,7 +4825,7 @@
                 </a:solidFill>
               </a:rPr>
               <a:pPr/>
-              <a:t>3/20/2017</a:t>
+              <a:t>3/21/2017</a:t>
             </a:fld>
             <a:endParaRPr lang="en-US">
               <a:solidFill>
@@ -5182,7 +5182,7 @@
                 </a:solidFill>
               </a:rPr>
               <a:pPr/>
-              <a:t>3/20/2017</a:t>
+              <a:t>3/21/2017</a:t>
             </a:fld>
             <a:endParaRPr lang="en-US">
               <a:solidFill>
@@ -5524,7 +5524,7 @@
                 </a:solidFill>
               </a:rPr>
               <a:pPr/>
-              <a:t>3/20/2017</a:t>
+              <a:t>3/21/2017</a:t>
             </a:fld>
             <a:endParaRPr lang="en-US">
               <a:solidFill>
@@ -5942,7 +5942,7 @@
                 </a:solidFill>
               </a:rPr>
               <a:pPr/>
-              <a:t>3/20/2017</a:t>
+              <a:t>3/21/2017</a:t>
             </a:fld>
             <a:endParaRPr lang="en-US">
               <a:solidFill>
@@ -6141,7 +6141,7 @@
                 </a:solidFill>
               </a:rPr>
               <a:pPr/>
-              <a:t>3/20/2017</a:t>
+              <a:t>3/21/2017</a:t>
             </a:fld>
             <a:endParaRPr lang="en-US">
               <a:solidFill>
@@ -6349,7 +6349,7 @@
                 </a:solidFill>
               </a:rPr>
               <a:pPr/>
-              <a:t>3/20/2017</a:t>
+              <a:t>3/21/2017</a:t>
             </a:fld>
             <a:endParaRPr lang="en-US">
               <a:solidFill>
@@ -6615,7 +6615,7 @@
             <a:fld id="{88794B8C-9C25-4502-91AC-D3600D9DAE48}" type="datetime1">
               <a:rPr lang="en-US" smtClean="0"/>
               <a:pPr/>
-              <a:t>3/20/2017</a:t>
+              <a:t>3/21/2017</a:t>
             </a:fld>
             <a:endParaRPr lang="en-US"/>
           </a:p>
@@ -6862,7 +6862,7 @@
             <a:fld id="{3DC8048B-2587-4881-92AB-D49A31D5A612}" type="datetime1">
               <a:rPr lang="en-US" smtClean="0"/>
               <a:pPr/>
-              <a:t>3/20/2017</a:t>
+              <a:t>3/21/2017</a:t>
             </a:fld>
             <a:endParaRPr lang="en-US"/>
           </a:p>
@@ -7231,7 +7231,7 @@
             <a:fld id="{54DCF270-1BF1-4750-86EA-2CBB5E03D75B}" type="datetime1">
               <a:rPr lang="en-US" smtClean="0"/>
               <a:pPr/>
-              <a:t>3/20/2017</a:t>
+              <a:t>3/21/2017</a:t>
             </a:fld>
             <a:endParaRPr lang="en-US"/>
           </a:p>
@@ -7351,7 +7351,7 @@
             <a:fld id="{55E553B1-3C32-45B8-8F45-E4A0B52DAE0D}" type="datetime1">
               <a:rPr lang="en-US" smtClean="0"/>
               <a:pPr/>
-              <a:t>3/20/2017</a:t>
+              <a:t>3/21/2017</a:t>
             </a:fld>
             <a:endParaRPr lang="en-US"/>
           </a:p>
@@ -7448,7 +7448,7 @@
             <a:fld id="{4F57D02A-8A53-43D3-B3ED-D08D89538281}" type="datetime1">
               <a:rPr lang="en-US" smtClean="0"/>
               <a:pPr/>
-              <a:t>3/20/2017</a:t>
+              <a:t>3/21/2017</a:t>
             </a:fld>
             <a:endParaRPr lang="en-US"/>
           </a:p>
@@ -7727,7 +7727,7 @@
             <a:fld id="{A918CE20-5FA2-4DEC-B586-21A327328F76}" type="datetime1">
               <a:rPr lang="en-US" smtClean="0"/>
               <a:pPr/>
-              <a:t>3/20/2017</a:t>
+              <a:t>3/21/2017</a:t>
             </a:fld>
             <a:endParaRPr lang="en-US"/>
           </a:p>
@@ -7986,7 +7986,7 @@
             <a:fld id="{0825CDBA-26A6-4F2A-A4E2-0E196F0AF72F}" type="datetime1">
               <a:rPr lang="en-US" smtClean="0"/>
               <a:pPr/>
-              <a:t>3/20/2017</a:t>
+              <a:t>3/21/2017</a:t>
             </a:fld>
             <a:endParaRPr lang="en-US"/>
           </a:p>
@@ -8201,7 +8201,7 @@
             <a:fld id="{DFAFDBB9-A580-4805-9C7E-9E45C09329B9}" type="datetime1">
               <a:rPr lang="en-US" smtClean="0"/>
               <a:pPr/>
-              <a:t>3/20/2017</a:t>
+              <a:t>3/21/2017</a:t>
             </a:fld>
             <a:endParaRPr lang="en-US"/>
           </a:p>
@@ -9360,7 +9360,7 @@
                 </a:solidFill>
               </a:rPr>
               <a:pPr/>
-              <a:t>3/20/2017</a:t>
+              <a:t>3/21/2017</a:t>
             </a:fld>
             <a:endParaRPr lang="en-US">
               <a:solidFill>
@@ -9975,7 +9975,7 @@
                   </a:outerShdw>
                 </a:effectLst>
               </a:rPr>
-              <a:t>Java</a:t>
+              <a:t>Java Design Pattern</a:t>
             </a:r>
             <a:r>
               <a:rPr lang="en-US" altLang="zh-TW" b="1" dirty="0" smtClean="0"/>
@@ -10047,38 +10047,6 @@
           </a:p>
         </p:txBody>
       </p:sp>
-      <p:pic>
-        <p:nvPicPr>
-          <p:cNvPr id="2" name="Picture 2"/>
-          <p:cNvPicPr>
-            <a:picLocks noChangeAspect="1" noChangeArrowheads="1"/>
-          </p:cNvPicPr>
-          <p:nvPr/>
-        </p:nvPicPr>
-        <p:blipFill>
-          <a:blip r:embed="rId4" cstate="print"/>
-          <a:srcRect/>
-          <a:stretch>
-            <a:fillRect/>
-          </a:stretch>
-        </p:blipFill>
-        <p:spPr bwMode="auto">
-          <a:xfrm>
-            <a:off x="4090786" y="4296228"/>
-            <a:ext cx="842485" cy="667203"/>
-          </a:xfrm>
-          <a:prstGeom prst="rect">
-            <a:avLst/>
-          </a:prstGeom>
-          <a:noFill/>
-          <a:ln w="9525">
-            <a:noFill/>
-            <a:miter lim="800000"/>
-            <a:headEnd/>
-            <a:tailEnd/>
-          </a:ln>
-        </p:spPr>
-      </p:pic>
       <p:pic>
         <p:nvPicPr>
           <p:cNvPr id="7" name="Picture 2"/>
@@ -10299,7 +10267,7 @@
             <a:pPr algn="ctr"/>
             <a:r>
               <a:rPr lang="en-US" dirty="0" smtClean="0"/>
-              <a:t>Python - CS596</a:t>
+              <a:t>Java Design Pattern - CS596</a:t>
             </a:r>
             <a:endParaRPr lang="en-US" dirty="0"/>
           </a:p>
@@ -10758,7 +10726,7 @@
             <a:pPr algn="ctr"/>
             <a:r>
               <a:rPr lang="en-US" dirty="0" smtClean="0"/>
-              <a:t>Python - CS596</a:t>
+              <a:t>Java Design Pattern - CS596</a:t>
             </a:r>
             <a:endParaRPr lang="en-US" dirty="0"/>
           </a:p>
@@ -11459,7 +11427,7 @@
             <a:pPr algn="ctr"/>
             <a:r>
               <a:rPr lang="en-US" dirty="0" smtClean="0"/>
-              <a:t>Python - CS596</a:t>
+              <a:t>Java Design Pattern - CS596</a:t>
             </a:r>
             <a:endParaRPr lang="en-US" dirty="0"/>
           </a:p>
@@ -11903,7 +11871,7 @@
             <a:pPr algn="ctr"/>
             <a:r>
               <a:rPr lang="en-US" dirty="0" smtClean="0"/>
-              <a:t>Python - CS596</a:t>
+              <a:t>Java Design Pattern - CS596</a:t>
             </a:r>
             <a:endParaRPr lang="en-US" dirty="0"/>
           </a:p>
@@ -12398,7 +12366,7 @@
             <a:pPr algn="ctr"/>
             <a:r>
               <a:rPr lang="en-US" dirty="0" smtClean="0"/>
-              <a:t>Python - CS596</a:t>
+              <a:t>Java Design Pattern - CS596</a:t>
             </a:r>
             <a:endParaRPr lang="en-US" dirty="0"/>
           </a:p>
@@ -12868,7 +12836,7 @@
             <a:pPr algn="ctr"/>
             <a:r>
               <a:rPr lang="en-US" dirty="0" smtClean="0"/>
-              <a:t>Python - CS596</a:t>
+              <a:t>Java Design Pattern - CS596</a:t>
             </a:r>
             <a:endParaRPr lang="en-US" dirty="0"/>
           </a:p>
@@ -12918,15 +12886,7 @@
             </a:r>
             <a:r>
               <a:rPr lang="en-US" altLang="zh-TW" sz="2000" dirty="0" smtClean="0"/>
-              <a:t> , there are 23 design patterns which can be classified in three categories: Creational, </a:t>
-            </a:r>
-            <a:r>
-              <a:rPr lang="en-US" altLang="zh-TW" sz="2000" dirty="0" smtClean="0"/>
-              <a:t>Structural, </a:t>
-            </a:r>
-            <a:r>
-              <a:rPr lang="en-US" altLang="zh-TW" sz="2000" dirty="0" smtClean="0"/>
-              <a:t>and Behavioral patterns. </a:t>
+              <a:t> , there are 23 design patterns which can be classified in three categories: Creational, Structural, and Behavioral patterns. </a:t>
             </a:r>
           </a:p>
           <a:p>

</xml_diff>